<commit_message>
Added ppt slide images
</commit_message>
<xml_diff>
--- a/Slides.pptx
+++ b/Slides.pptx
@@ -3729,11 +3729,11 @@
           <a:lstStyle/>
           <a:p>
             <a:r>
-              <a:rPr lang="en-US" sz="1400" b="1" i="1" dirty="0" err="1"/>
+              <a:rPr lang="en-US" sz="1400" b="1" i="1" dirty="0"/>
               <a:t>f</a:t>
             </a:r>
             <a:r>
-              <a:rPr lang="en-US" sz="1400" b="1" i="1" baseline="-25000" dirty="0" err="1"/>
+              <a:rPr lang="en-US" sz="1400" b="1" i="1" baseline="-25000" dirty="0"/>
               <a:t>x</a:t>
             </a:r>
             <a:r>
@@ -4158,7 +4158,7 @@
         </p:nvGrpSpPr>
         <p:grpSpPr>
           <a:xfrm>
-            <a:off x="3603576" y="975853"/>
+            <a:off x="3601021" y="983409"/>
             <a:ext cx="5951338" cy="2316703"/>
             <a:chOff x="2705232" y="979364"/>
             <a:chExt cx="6840525" cy="2316703"/>
@@ -4290,11 +4290,11 @@
           <a:p>
             <a:pPr algn="ctr"/>
             <a:r>
-              <a:rPr lang="en-US" sz="1400" b="1" dirty="0" err="1"/>
+              <a:rPr lang="en-US" sz="1400" b="1" dirty="0"/>
               <a:t>x</a:t>
             </a:r>
             <a:r>
-              <a:rPr lang="en-US" sz="1400" b="1" baseline="-25000" dirty="0" err="1"/>
+              <a:rPr lang="en-US" sz="1400" b="1" baseline="-25000" dirty="0"/>
               <a:t>a</a:t>
             </a:r>
             <a:endParaRPr lang="en-SG" sz="1400" baseline="-25000" dirty="0"/>
@@ -4331,11 +4331,11 @@
           <a:p>
             <a:pPr algn="ctr"/>
             <a:r>
-              <a:rPr lang="en-US" sz="1400" b="1" dirty="0" err="1"/>
+              <a:rPr lang="en-US" sz="1400" b="1" dirty="0"/>
               <a:t>x</a:t>
             </a:r>
             <a:r>
-              <a:rPr lang="en-US" sz="1400" b="1" baseline="-25000" dirty="0" err="1"/>
+              <a:rPr lang="en-US" sz="1400" b="1" baseline="-25000" dirty="0"/>
               <a:t>b</a:t>
             </a:r>
             <a:endParaRPr lang="en-SG" sz="1400" b="1" baseline="-25000" dirty="0"/>

</xml_diff>